<commit_message>
Working on the MSR mining.
</commit_message>
<xml_diff>
--- a/techreports/09-09/figures/design/Experiments.pptx
+++ b/techreports/09-09/figures/design/Experiments.pptx
@@ -8,7 +8,7 @@
     <p:sldId id="256" r:id="rId2"/>
   </p:sldIdLst>
   <p:sldSz cx="9144000" cy="6858000" type="screen4x3"/>
-  <p:notesSz cx="7315200" cy="9601200"/>
+  <p:notesSz cx="6858000" cy="9296400"/>
   <p:defaultTextStyle>
     <a:defPPr>
       <a:defRPr lang="en-US"/>
@@ -3453,11 +3453,7 @@
                     <a:p>
                       <a:r>
                         <a:rPr lang="en-US" sz="1100" dirty="0" smtClean="0"/>
-                        <a:t>Discovering unforeseen applications </a:t>
-                      </a:r>
-                      <a:r>
-                        <a:rPr lang="en-US" sz="1100" smtClean="0"/>
-                        <a:t>of Trajectory.</a:t>
+                        <a:t>Discovering unforeseen applications of Trajectory.</a:t>
                       </a:r>
                       <a:endParaRPr lang="en-US" sz="1100" dirty="0"/>
                     </a:p>

</xml_diff>